<commit_message>
Finished up slideshow presentation.
</commit_message>
<xml_diff>
--- a/milestone1/CS 4770.pptx
+++ b/milestone1/CS 4770.pptx
@@ -113,6 +113,22 @@
       </a:defRPr>
     </a:lvl9pPr>
   </p:defaultTextStyle>
+  <p:extLst>
+    <p:ext uri="{EFAFB233-063F-42B5-8137-9DF3F51BA10A}">
+      <p15:sldGuideLst xmlns:p15="http://schemas.microsoft.com/office/powerpoint/2012/main">
+        <p15:guide id="1" orient="horz" pos="2160">
+          <p15:clr>
+            <a:srgbClr val="A4A3A4"/>
+          </p15:clr>
+        </p15:guide>
+        <p15:guide id="2" pos="2880">
+          <p15:clr>
+            <a:srgbClr val="A4A3A4"/>
+          </p15:clr>
+        </p15:guide>
+      </p15:sldGuideLst>
+    </p:ext>
+  </p:extLst>
 </p:presentation>
 </file>
 
@@ -3187,7 +3203,7 @@
           </a:lstStyle>
           <a:p>
             <a:r>
-              <a:rPr lang="en-US" smtClean="0"/>
+              <a:rPr lang="en-US"/>
               <a:t>Click to edit Master title style</a:t>
             </a:r>
             <a:endParaRPr lang="en-US" dirty="0"/>
@@ -3306,7 +3322,7 @@
           </a:lstStyle>
           <a:p>
             <a:r>
-              <a:rPr lang="en-US" smtClean="0"/>
+              <a:rPr lang="en-US"/>
               <a:t>Click to edit Master subtitle style</a:t>
             </a:r>
             <a:endParaRPr lang="en-US" dirty="0"/>
@@ -3354,10 +3370,9 @@
           <a:lstStyle/>
           <a:p>
             <a:r>
-              <a:rPr lang="en-US" smtClean="0"/>
+              <a:rPr lang="en-US"/>
               <a:t>Click to edit Master title style</a:t>
             </a:r>
-            <a:endParaRPr lang="en-US"/>
           </a:p>
         </p:txBody>
       </p:sp>
@@ -3378,38 +3393,37 @@
           <a:p>
             <a:pPr lvl="0"/>
             <a:r>
-              <a:rPr lang="en-US" smtClean="0"/>
+              <a:rPr lang="en-US"/>
               <a:t>Click to edit Master text styles</a:t>
             </a:r>
           </a:p>
           <a:p>
             <a:pPr lvl="1"/>
             <a:r>
-              <a:rPr lang="en-US" smtClean="0"/>
+              <a:rPr lang="en-US"/>
               <a:t>Second level</a:t>
             </a:r>
           </a:p>
           <a:p>
             <a:pPr lvl="2"/>
             <a:r>
-              <a:rPr lang="en-US" smtClean="0"/>
+              <a:rPr lang="en-US"/>
               <a:t>Third level</a:t>
             </a:r>
           </a:p>
           <a:p>
             <a:pPr lvl="3"/>
             <a:r>
-              <a:rPr lang="en-US" smtClean="0"/>
+              <a:rPr lang="en-US"/>
               <a:t>Fourth level</a:t>
             </a:r>
           </a:p>
           <a:p>
             <a:pPr lvl="4"/>
             <a:r>
-              <a:rPr lang="en-US" smtClean="0"/>
+              <a:rPr lang="en-US"/>
               <a:t>Fifth level</a:t>
             </a:r>
-            <a:endParaRPr lang="en-US"/>
           </a:p>
         </p:txBody>
       </p:sp>
@@ -3524,10 +3538,9 @@
           <a:lstStyle/>
           <a:p>
             <a:r>
-              <a:rPr lang="en-US" smtClean="0"/>
+              <a:rPr lang="en-US"/>
               <a:t>Click to edit Master title style</a:t>
             </a:r>
-            <a:endParaRPr lang="en-US"/>
           </a:p>
         </p:txBody>
       </p:sp>
@@ -3553,38 +3566,37 @@
           <a:p>
             <a:pPr lvl="0"/>
             <a:r>
-              <a:rPr lang="en-US" smtClean="0"/>
+              <a:rPr lang="en-US"/>
               <a:t>Click to edit Master text styles</a:t>
             </a:r>
           </a:p>
           <a:p>
             <a:pPr lvl="1"/>
             <a:r>
-              <a:rPr lang="en-US" smtClean="0"/>
+              <a:rPr lang="en-US"/>
               <a:t>Second level</a:t>
             </a:r>
           </a:p>
           <a:p>
             <a:pPr lvl="2"/>
             <a:r>
-              <a:rPr lang="en-US" smtClean="0"/>
+              <a:rPr lang="en-US"/>
               <a:t>Third level</a:t>
             </a:r>
           </a:p>
           <a:p>
             <a:pPr lvl="3"/>
             <a:r>
-              <a:rPr lang="en-US" smtClean="0"/>
+              <a:rPr lang="en-US"/>
               <a:t>Fourth level</a:t>
             </a:r>
           </a:p>
           <a:p>
             <a:pPr lvl="4"/>
             <a:r>
-              <a:rPr lang="en-US" smtClean="0"/>
+              <a:rPr lang="en-US"/>
               <a:t>Fifth level</a:t>
             </a:r>
-            <a:endParaRPr lang="en-US"/>
           </a:p>
         </p:txBody>
       </p:sp>
@@ -3694,7 +3706,7 @@
           <a:lstStyle/>
           <a:p>
             <a:r>
-              <a:rPr lang="en-US" smtClean="0"/>
+              <a:rPr lang="en-US"/>
               <a:t>Click to edit Master title style</a:t>
             </a:r>
             <a:endParaRPr lang="en-US" dirty="0"/>
@@ -3718,38 +3730,37 @@
           <a:p>
             <a:pPr lvl="0"/>
             <a:r>
-              <a:rPr lang="en-US" smtClean="0"/>
+              <a:rPr lang="en-US"/>
               <a:t>Click to edit Master text styles</a:t>
             </a:r>
           </a:p>
           <a:p>
             <a:pPr lvl="1"/>
             <a:r>
-              <a:rPr lang="en-US" smtClean="0"/>
+              <a:rPr lang="en-US"/>
               <a:t>Second level</a:t>
             </a:r>
           </a:p>
           <a:p>
             <a:pPr lvl="2"/>
             <a:r>
-              <a:rPr lang="en-US" smtClean="0"/>
+              <a:rPr lang="en-US"/>
               <a:t>Third level</a:t>
             </a:r>
           </a:p>
           <a:p>
             <a:pPr lvl="3"/>
             <a:r>
-              <a:rPr lang="en-US" smtClean="0"/>
+              <a:rPr lang="en-US"/>
               <a:t>Fourth level</a:t>
             </a:r>
           </a:p>
           <a:p>
             <a:pPr lvl="4"/>
             <a:r>
-              <a:rPr lang="en-US" smtClean="0"/>
+              <a:rPr lang="en-US"/>
               <a:t>Fifth level</a:t>
             </a:r>
-            <a:endParaRPr lang="en-US"/>
           </a:p>
         </p:txBody>
       </p:sp>
@@ -6843,7 +6854,7 @@
           <a:p>
             <a:pPr lvl="0"/>
             <a:r>
-              <a:rPr lang="en-US" smtClean="0"/>
+              <a:rPr lang="en-US"/>
               <a:t>Click to edit Master text styles</a:t>
             </a:r>
           </a:p>
@@ -6870,10 +6881,9 @@
           <a:lstStyle/>
           <a:p>
             <a:r>
-              <a:rPr lang="en-US" smtClean="0"/>
+              <a:rPr lang="en-US"/>
               <a:t>Click to edit Master title style</a:t>
             </a:r>
-            <a:endParaRPr lang="en-US"/>
           </a:p>
         </p:txBody>
       </p:sp>
@@ -6983,10 +6993,9 @@
           <a:lstStyle/>
           <a:p>
             <a:r>
-              <a:rPr lang="en-US" smtClean="0"/>
+              <a:rPr lang="en-US"/>
               <a:t>Click to edit Master title style</a:t>
             </a:r>
-            <a:endParaRPr lang="en-US"/>
           </a:p>
         </p:txBody>
       </p:sp>
@@ -7040,38 +7049,37 @@
           <a:p>
             <a:pPr lvl="0"/>
             <a:r>
-              <a:rPr lang="en-US" smtClean="0"/>
+              <a:rPr lang="en-US"/>
               <a:t>Click to edit Master text styles</a:t>
             </a:r>
           </a:p>
           <a:p>
             <a:pPr lvl="1"/>
             <a:r>
-              <a:rPr lang="en-US" smtClean="0"/>
+              <a:rPr lang="en-US"/>
               <a:t>Second level</a:t>
             </a:r>
           </a:p>
           <a:p>
             <a:pPr lvl="2"/>
             <a:r>
-              <a:rPr lang="en-US" smtClean="0"/>
+              <a:rPr lang="en-US"/>
               <a:t>Third level</a:t>
             </a:r>
           </a:p>
           <a:p>
             <a:pPr lvl="3"/>
             <a:r>
-              <a:rPr lang="en-US" smtClean="0"/>
+              <a:rPr lang="en-US"/>
               <a:t>Fourth level</a:t>
             </a:r>
           </a:p>
           <a:p>
             <a:pPr lvl="4"/>
             <a:r>
-              <a:rPr lang="en-US" smtClean="0"/>
+              <a:rPr lang="en-US"/>
               <a:t>Fifth level</a:t>
             </a:r>
-            <a:endParaRPr lang="en-US"/>
           </a:p>
         </p:txBody>
       </p:sp>
@@ -7125,38 +7133,37 @@
           <a:p>
             <a:pPr lvl="0"/>
             <a:r>
-              <a:rPr lang="en-US" smtClean="0"/>
+              <a:rPr lang="en-US"/>
               <a:t>Click to edit Master text styles</a:t>
             </a:r>
           </a:p>
           <a:p>
             <a:pPr lvl="1"/>
             <a:r>
-              <a:rPr lang="en-US" smtClean="0"/>
+              <a:rPr lang="en-US"/>
               <a:t>Second level</a:t>
             </a:r>
           </a:p>
           <a:p>
             <a:pPr lvl="2"/>
             <a:r>
-              <a:rPr lang="en-US" smtClean="0"/>
+              <a:rPr lang="en-US"/>
               <a:t>Third level</a:t>
             </a:r>
           </a:p>
           <a:p>
             <a:pPr lvl="3"/>
             <a:r>
-              <a:rPr lang="en-US" smtClean="0"/>
+              <a:rPr lang="en-US"/>
               <a:t>Fourth level</a:t>
             </a:r>
           </a:p>
           <a:p>
             <a:pPr lvl="4"/>
             <a:r>
-              <a:rPr lang="en-US" smtClean="0"/>
+              <a:rPr lang="en-US"/>
               <a:t>Fifth level</a:t>
             </a:r>
-            <a:endParaRPr lang="en-US"/>
           </a:p>
         </p:txBody>
       </p:sp>
@@ -7270,10 +7277,9 @@
           </a:lstStyle>
           <a:p>
             <a:r>
-              <a:rPr lang="en-US" smtClean="0"/>
+              <a:rPr lang="en-US"/>
               <a:t>Click to edit Master title style</a:t>
             </a:r>
-            <a:endParaRPr lang="en-US"/>
           </a:p>
         </p:txBody>
       </p:sp>
@@ -7336,7 +7342,7 @@
           <a:p>
             <a:pPr lvl="0"/>
             <a:r>
-              <a:rPr lang="en-US" smtClean="0"/>
+              <a:rPr lang="en-US"/>
               <a:t>Click to edit Master text styles</a:t>
             </a:r>
           </a:p>
@@ -7392,38 +7398,37 @@
           <a:p>
             <a:pPr lvl="0"/>
             <a:r>
-              <a:rPr lang="en-US" smtClean="0"/>
+              <a:rPr lang="en-US"/>
               <a:t>Click to edit Master text styles</a:t>
             </a:r>
           </a:p>
           <a:p>
             <a:pPr lvl="1"/>
             <a:r>
-              <a:rPr lang="en-US" smtClean="0"/>
+              <a:rPr lang="en-US"/>
               <a:t>Second level</a:t>
             </a:r>
           </a:p>
           <a:p>
             <a:pPr lvl="2"/>
             <a:r>
-              <a:rPr lang="en-US" smtClean="0"/>
+              <a:rPr lang="en-US"/>
               <a:t>Third level</a:t>
             </a:r>
           </a:p>
           <a:p>
             <a:pPr lvl="3"/>
             <a:r>
-              <a:rPr lang="en-US" smtClean="0"/>
+              <a:rPr lang="en-US"/>
               <a:t>Fourth level</a:t>
             </a:r>
           </a:p>
           <a:p>
             <a:pPr lvl="4"/>
             <a:r>
-              <a:rPr lang="en-US" smtClean="0"/>
+              <a:rPr lang="en-US"/>
               <a:t>Fifth level</a:t>
             </a:r>
-            <a:endParaRPr lang="en-US"/>
           </a:p>
         </p:txBody>
       </p:sp>
@@ -7486,7 +7491,7 @@
           <a:p>
             <a:pPr lvl="0"/>
             <a:r>
-              <a:rPr lang="en-US" smtClean="0"/>
+              <a:rPr lang="en-US"/>
               <a:t>Click to edit Master text styles</a:t>
             </a:r>
           </a:p>
@@ -7542,38 +7547,37 @@
           <a:p>
             <a:pPr lvl="0"/>
             <a:r>
-              <a:rPr lang="en-US" smtClean="0"/>
+              <a:rPr lang="en-US"/>
               <a:t>Click to edit Master text styles</a:t>
             </a:r>
           </a:p>
           <a:p>
             <a:pPr lvl="1"/>
             <a:r>
-              <a:rPr lang="en-US" smtClean="0"/>
+              <a:rPr lang="en-US"/>
               <a:t>Second level</a:t>
             </a:r>
           </a:p>
           <a:p>
             <a:pPr lvl="2"/>
             <a:r>
-              <a:rPr lang="en-US" smtClean="0"/>
+              <a:rPr lang="en-US"/>
               <a:t>Third level</a:t>
             </a:r>
           </a:p>
           <a:p>
             <a:pPr lvl="3"/>
             <a:r>
-              <a:rPr lang="en-US" smtClean="0"/>
+              <a:rPr lang="en-US"/>
               <a:t>Fourth level</a:t>
             </a:r>
           </a:p>
           <a:p>
             <a:pPr lvl="4"/>
             <a:r>
-              <a:rPr lang="en-US" smtClean="0"/>
+              <a:rPr lang="en-US"/>
               <a:t>Fifth level</a:t>
             </a:r>
-            <a:endParaRPr lang="en-US"/>
           </a:p>
         </p:txBody>
       </p:sp>
@@ -7683,10 +7687,9 @@
           <a:lstStyle/>
           <a:p>
             <a:r>
-              <a:rPr lang="en-US" smtClean="0"/>
+              <a:rPr lang="en-US"/>
               <a:t>Click to edit Master title style</a:t>
             </a:r>
-            <a:endParaRPr lang="en-US"/>
           </a:p>
         </p:txBody>
       </p:sp>
@@ -7920,35 +7923,35 @@
           <a:p>
             <a:pPr lvl="0"/>
             <a:r>
-              <a:rPr lang="en-US" smtClean="0"/>
+              <a:rPr lang="en-US"/>
               <a:t>Click to edit Master text styles</a:t>
             </a:r>
           </a:p>
           <a:p>
             <a:pPr lvl="1"/>
             <a:r>
-              <a:rPr lang="en-US" smtClean="0"/>
+              <a:rPr lang="en-US"/>
               <a:t>Second level</a:t>
             </a:r>
           </a:p>
           <a:p>
             <a:pPr lvl="2"/>
             <a:r>
-              <a:rPr lang="en-US" smtClean="0"/>
+              <a:rPr lang="en-US"/>
               <a:t>Third level</a:t>
             </a:r>
           </a:p>
           <a:p>
             <a:pPr lvl="3"/>
             <a:r>
-              <a:rPr lang="en-US" smtClean="0"/>
+              <a:rPr lang="en-US"/>
               <a:t>Fourth level</a:t>
             </a:r>
           </a:p>
           <a:p>
             <a:pPr lvl="4"/>
             <a:r>
-              <a:rPr lang="en-US" smtClean="0"/>
+              <a:rPr lang="en-US"/>
               <a:t>Fifth level</a:t>
             </a:r>
             <a:endParaRPr lang="en-US" dirty="0"/>
@@ -8245,7 +8248,7 @@
           </a:lstStyle>
           <a:p>
             <a:r>
-              <a:rPr lang="en-US" smtClean="0"/>
+              <a:rPr lang="en-US"/>
               <a:t>Click to edit Master title style</a:t>
             </a:r>
             <a:endParaRPr lang="en-US" dirty="0"/>
@@ -8317,7 +8320,7 @@
           <a:p>
             <a:pPr lvl="0"/>
             <a:r>
-              <a:rPr lang="en-US" smtClean="0"/>
+              <a:rPr lang="en-US"/>
               <a:t>Click to edit Master text styles</a:t>
             </a:r>
           </a:p>
@@ -8434,10 +8437,9 @@
           </a:lstStyle>
           <a:p>
             <a:r>
-              <a:rPr lang="en-US" smtClean="0"/>
+              <a:rPr lang="en-US"/>
               <a:t>Click icon to add picture</a:t>
             </a:r>
-            <a:endParaRPr lang="en-US"/>
           </a:p>
         </p:txBody>
       </p:sp>
@@ -8721,7 +8723,7 @@
           </a:lstStyle>
           <a:p>
             <a:r>
-              <a:rPr lang="en-US" smtClean="0"/>
+              <a:rPr lang="en-US"/>
               <a:t>Click to edit Master title style</a:t>
             </a:r>
             <a:endParaRPr lang="en-US" dirty="0"/>
@@ -8793,7 +8795,7 @@
           <a:p>
             <a:pPr lvl="0"/>
             <a:r>
-              <a:rPr lang="en-US" smtClean="0"/>
+              <a:rPr lang="en-US"/>
               <a:t>Click to edit Master text styles</a:t>
             </a:r>
           </a:p>
@@ -8908,7 +8910,7 @@
           <a:lstStyle/>
           <a:p>
             <a:r>
-              <a:rPr lang="en-US" smtClean="0"/>
+              <a:rPr lang="en-US"/>
               <a:t>Click to edit Master title style</a:t>
             </a:r>
             <a:endParaRPr lang="en-US" dirty="0"/>
@@ -8942,35 +8944,35 @@
           <a:p>
             <a:pPr lvl="0"/>
             <a:r>
-              <a:rPr lang="en-US" smtClean="0"/>
+              <a:rPr lang="en-US"/>
               <a:t>Click to edit Master text styles</a:t>
             </a:r>
           </a:p>
           <a:p>
             <a:pPr lvl="1"/>
             <a:r>
-              <a:rPr lang="en-US" smtClean="0"/>
+              <a:rPr lang="en-US"/>
               <a:t>Second level</a:t>
             </a:r>
           </a:p>
           <a:p>
             <a:pPr lvl="2"/>
             <a:r>
-              <a:rPr lang="en-US" smtClean="0"/>
+              <a:rPr lang="en-US"/>
               <a:t>Third level</a:t>
             </a:r>
           </a:p>
           <a:p>
             <a:pPr lvl="3"/>
             <a:r>
-              <a:rPr lang="en-US" smtClean="0"/>
+              <a:rPr lang="en-US"/>
               <a:t>Fourth level</a:t>
             </a:r>
           </a:p>
           <a:p>
             <a:pPr lvl="4"/>
             <a:r>
-              <a:rPr lang="en-US" smtClean="0"/>
+              <a:rPr lang="en-US"/>
               <a:t>Fifth level</a:t>
             </a:r>
             <a:endParaRPr lang="en-US" dirty="0"/>
@@ -9433,16 +9435,20 @@
             <p:ph type="ctrTitle"/>
           </p:nvPr>
         </p:nvSpPr>
-        <p:spPr/>
+        <p:spPr>
+          <a:xfrm>
+            <a:off x="0" y="2102993"/>
+            <a:ext cx="4419600" cy="1600327"/>
+          </a:xfrm>
+        </p:spPr>
         <p:txBody>
           <a:bodyPr/>
           <a:lstStyle/>
           <a:p>
             <a:r>
-              <a:rPr lang="en-US" dirty="0" smtClean="0"/>
+              <a:rPr lang="en-US" dirty="0"/>
               <a:t>CS 4770 – GROUP B</a:t>
             </a:r>
-            <a:endParaRPr lang="en-US" dirty="0"/>
           </a:p>
         </p:txBody>
       </p:sp>
@@ -9462,10 +9468,9 @@
           <a:lstStyle/>
           <a:p>
             <a:r>
-              <a:rPr lang="en-US" dirty="0" smtClean="0"/>
+              <a:rPr lang="en-US" dirty="0"/>
               <a:t>Osede Onodenalore, Samuel Ash, Jeff Conway, Maria Aloysius</a:t>
             </a:r>
-            <a:endParaRPr lang="en-US" dirty="0"/>
           </a:p>
         </p:txBody>
       </p:sp>
@@ -9479,13 +9484,6 @@
   <p:clrMapOvr>
     <a:masterClrMapping/>
   </p:clrMapOvr>
-  <p:timing>
-    <p:tnLst>
-      <p:par>
-        <p:cTn id="1" dur="indefinite" restart="never" nodeType="tmRoot"/>
-      </p:par>
-    </p:tnLst>
-  </p:timing>
 </p:sld>
 </file>
 
@@ -9527,10 +9525,9 @@
           <a:lstStyle/>
           <a:p>
             <a:r>
-              <a:rPr lang="en-US" sz="3200" dirty="0" smtClean="0"/>
+              <a:rPr lang="en-US" sz="3200" dirty="0"/>
               <a:t>Future Development Plans</a:t>
             </a:r>
-            <a:endParaRPr lang="en-US" sz="3200" dirty="0"/>
           </a:p>
         </p:txBody>
       </p:sp>
@@ -9546,10 +9543,76 @@
         </p:nvSpPr>
         <p:spPr/>
         <p:txBody>
-          <a:bodyPr/>
+          <a:bodyPr>
+            <a:normAutofit fontScale="70000" lnSpcReduction="20000"/>
+          </a:bodyPr>
           <a:lstStyle/>
           <a:p>
-            <a:endParaRPr lang="en-US"/>
+            <a:pPr marL="0" indent="0">
+              <a:buNone/>
+            </a:pPr>
+            <a:r>
+              <a:rPr lang="en-CA" dirty="0"/>
+              <a:t>We will develop our software system in this order: </a:t>
+            </a:r>
+          </a:p>
+          <a:p>
+            <a:pPr marL="0" indent="0">
+              <a:buNone/>
+            </a:pPr>
+            <a:endParaRPr lang="en-CA" dirty="0"/>
+          </a:p>
+          <a:p>
+            <a:pPr lvl="0"/>
+            <a:r>
+              <a:rPr lang="en-CA" dirty="0"/>
+              <a:t>Node mailing server</a:t>
+            </a:r>
+          </a:p>
+          <a:p>
+            <a:pPr lvl="0"/>
+            <a:r>
+              <a:rPr lang="en-CA" dirty="0"/>
+              <a:t>Creating a post and its associated functionalities such as comments, visibility, adding images and publishing</a:t>
+            </a:r>
+          </a:p>
+          <a:p>
+            <a:pPr lvl="0"/>
+            <a:r>
+              <a:rPr lang="en-CA" dirty="0"/>
+              <a:t>Adding friends</a:t>
+            </a:r>
+          </a:p>
+          <a:p>
+            <a:pPr lvl="0"/>
+            <a:r>
+              <a:rPr lang="en-CA" dirty="0"/>
+              <a:t>Profile management- this will include adding resumes and class schedules</a:t>
+            </a:r>
+          </a:p>
+          <a:p>
+            <a:pPr lvl="0"/>
+            <a:r>
+              <a:rPr lang="en-CA" dirty="0"/>
+              <a:t>Creating study groups</a:t>
+            </a:r>
+          </a:p>
+          <a:p>
+            <a:pPr lvl="0"/>
+            <a:r>
+              <a:rPr lang="en-CA" dirty="0"/>
+              <a:t>Creating polls</a:t>
+            </a:r>
+          </a:p>
+          <a:p>
+            <a:pPr lvl="0"/>
+            <a:r>
+              <a:rPr lang="en-CA" dirty="0"/>
+              <a:t>Lost and found section</a:t>
+            </a:r>
+          </a:p>
+          <a:p>
+            <a:endParaRPr lang="en-US" dirty="0"/>
           </a:p>
         </p:txBody>
       </p:sp>
@@ -9565,10 +9628,48 @@
         </p:nvSpPr>
         <p:spPr/>
         <p:txBody>
-          <a:bodyPr/>
+          <a:bodyPr>
+            <a:normAutofit fontScale="70000" lnSpcReduction="20000"/>
+          </a:bodyPr>
           <a:lstStyle/>
           <a:p>
-            <a:endParaRPr lang="en-US"/>
+            <a:pPr marL="0" indent="0" algn="ctr">
+              <a:buNone/>
+            </a:pPr>
+            <a:r>
+              <a:rPr lang="en-US" dirty="0"/>
+              <a:t>Team Member Responsibilities:</a:t>
+            </a:r>
+          </a:p>
+          <a:p>
+            <a:pPr marL="0" indent="0" algn="ctr">
+              <a:buNone/>
+            </a:pPr>
+            <a:endParaRPr lang="en-US" dirty="0"/>
+          </a:p>
+          <a:p>
+            <a:r>
+              <a:rPr lang="en-US" dirty="0"/>
+              <a:t>Models- Osede</a:t>
+            </a:r>
+          </a:p>
+          <a:p>
+            <a:r>
+              <a:rPr lang="en-US" dirty="0"/>
+              <a:t>Code Structure- Sam</a:t>
+            </a:r>
+          </a:p>
+          <a:p>
+            <a:r>
+              <a:rPr lang="en-US" dirty="0"/>
+              <a:t>Design- Jeff</a:t>
+            </a:r>
+          </a:p>
+          <a:p>
+            <a:r>
+              <a:rPr lang="en-US" dirty="0"/>
+              <a:t>Research/Development- Maria</a:t>
+            </a:r>
           </a:p>
         </p:txBody>
       </p:sp>
@@ -9582,13 +9683,6 @@
   <p:clrMapOvr>
     <a:masterClrMapping/>
   </p:clrMapOvr>
-  <p:timing>
-    <p:tnLst>
-      <p:par>
-        <p:cTn id="1" dur="indefinite" restart="never" nodeType="tmRoot"/>
-      </p:par>
-    </p:tnLst>
-  </p:timing>
 </p:sld>
 </file>
 
@@ -9632,10 +9726,9 @@
           <a:lstStyle/>
           <a:p>
             <a:r>
-              <a:rPr lang="en-US" sz="3600" dirty="0" smtClean="0"/>
+              <a:rPr lang="en-US" sz="3600" dirty="0"/>
               <a:t>MUNSSN – Student Social Network</a:t>
             </a:r>
-            <a:endParaRPr lang="en-US" sz="3600" dirty="0"/>
           </a:p>
         </p:txBody>
       </p:sp>
@@ -9663,13 +9756,13 @@
               <a:buNone/>
             </a:pPr>
             <a:r>
-              <a:rPr lang="en-US" u="sng" dirty="0" smtClean="0"/>
+              <a:rPr lang="en-US" u="sng" dirty="0"/>
               <a:t>Purpose</a:t>
             </a:r>
           </a:p>
           <a:p>
             <a:r>
-              <a:rPr lang="en-US" dirty="0" smtClean="0"/>
+              <a:rPr lang="en-US" dirty="0"/>
               <a:t>The project is intended for Student users at Memorial University, to interact with other users within the university, share opinions and content.</a:t>
             </a:r>
           </a:p>
@@ -9677,30 +9770,23 @@
             <a:pPr marL="0" indent="0">
               <a:buNone/>
             </a:pPr>
-            <a:endParaRPr lang="en-US" dirty="0" smtClean="0"/>
+            <a:endParaRPr lang="en-US" dirty="0"/>
           </a:p>
           <a:p>
             <a:pPr marL="0" indent="0">
               <a:buNone/>
             </a:pPr>
             <a:r>
-              <a:rPr lang="en-US" u="sng" dirty="0" smtClean="0"/>
+              <a:rPr lang="en-US" u="sng" dirty="0"/>
               <a:t>Scope</a:t>
             </a:r>
-            <a:endParaRPr lang="en-US" u="sng" dirty="0"/>
-          </a:p>
-          <a:p>
-            <a:r>
-              <a:rPr lang="en-US" dirty="0" smtClean="0">
-                <a:effectLst/>
-              </a:rPr>
-              <a:t>This project </a:t>
-            </a:r>
+          </a:p>
+          <a:p>
             <a:r>
               <a:rPr lang="en-US" dirty="0">
                 <a:effectLst/>
               </a:rPr>
-              <a:t>will be written in Node.js and will use </a:t>
+              <a:t>This project will be written in Node.js and will use </a:t>
             </a:r>
             <a:r>
               <a:rPr lang="en-US" dirty="0" err="1">
@@ -9719,7 +9805,7 @@
             <a:pPr marL="18288" indent="0">
               <a:buNone/>
             </a:pPr>
-            <a:endParaRPr lang="en-US" dirty="0" smtClean="0"/>
+            <a:endParaRPr lang="en-US" dirty="0"/>
           </a:p>
         </p:txBody>
       </p:sp>
@@ -9733,13 +9819,6 @@
   <p:clrMapOvr>
     <a:masterClrMapping/>
   </p:clrMapOvr>
-  <p:timing>
-    <p:tnLst>
-      <p:par>
-        <p:cTn id="1" dur="indefinite" restart="never" nodeType="tmRoot"/>
-      </p:par>
-    </p:tnLst>
-  </p:timing>
 </p:sld>
 </file>
 
@@ -9772,7 +9851,7 @@
         </p:nvSpPr>
         <p:spPr>
           <a:xfrm>
-            <a:off x="2286000" y="304800"/>
+            <a:off x="990600" y="457200"/>
             <a:ext cx="7543800" cy="914400"/>
           </a:xfrm>
         </p:spPr>
@@ -9780,11 +9859,11 @@
           <a:bodyPr/>
           <a:lstStyle/>
           <a:p>
-            <a:r>
-              <a:rPr lang="en-US" sz="3000" dirty="0" smtClean="0"/>
+            <a:pPr algn="ctr"/>
+            <a:r>
+              <a:rPr lang="en-US" sz="3000" dirty="0"/>
               <a:t>Functions &amp; Constraints</a:t>
             </a:r>
-            <a:endParaRPr lang="en-US" sz="3000" dirty="0"/>
           </a:p>
         </p:txBody>
       </p:sp>
@@ -9810,29 +9889,26 @@
           </a:bodyPr>
           <a:lstStyle/>
           <a:p>
+            <a:pPr marL="0" indent="0" algn="ctr">
+              <a:buNone/>
+            </a:pPr>
             <a:r>
               <a:rPr lang="en-US" sz="1800" dirty="0">
                 <a:effectLst/>
                 <a:latin typeface="Times New Roman" pitchFamily="18" charset="0"/>
                 <a:cs typeface="Times New Roman" pitchFamily="18" charset="0"/>
               </a:rPr>
-              <a:t>C</a:t>
-            </a:r>
-            <a:r>
-              <a:rPr lang="en-US" sz="1800" dirty="0" smtClean="0">
-                <a:effectLst/>
-                <a:latin typeface="Times New Roman" pitchFamily="18" charset="0"/>
-                <a:cs typeface="Times New Roman" pitchFamily="18" charset="0"/>
-              </a:rPr>
-              <a:t>reate </a:t>
-            </a:r>
+              <a:t>Functions:</a:t>
+            </a:r>
+          </a:p>
+          <a:p>
             <a:r>
               <a:rPr lang="en-US" sz="1800" dirty="0">
                 <a:effectLst/>
                 <a:latin typeface="Times New Roman" pitchFamily="18" charset="0"/>
                 <a:cs typeface="Times New Roman" pitchFamily="18" charset="0"/>
               </a:rPr>
-              <a:t>a user profile</a:t>
+              <a:t>Create a user profile</a:t>
             </a:r>
           </a:p>
           <a:p>
@@ -9842,23 +9918,17 @@
                 <a:latin typeface="Times New Roman" pitchFamily="18" charset="0"/>
                 <a:cs typeface="Times New Roman" pitchFamily="18" charset="0"/>
               </a:rPr>
-              <a:t>S</a:t>
-            </a:r>
-            <a:r>
-              <a:rPr lang="en-US" sz="1800" dirty="0" smtClean="0">
-                <a:effectLst/>
-                <a:latin typeface="Times New Roman" pitchFamily="18" charset="0"/>
-                <a:cs typeface="Times New Roman" pitchFamily="18" charset="0"/>
-              </a:rPr>
-              <a:t>ign </a:t>
-            </a:r>
+              <a:t>Sign in a registered user</a:t>
+            </a:r>
+          </a:p>
+          <a:p>
             <a:r>
               <a:rPr lang="en-US" sz="1800" dirty="0">
                 <a:effectLst/>
                 <a:latin typeface="Times New Roman" pitchFamily="18" charset="0"/>
                 <a:cs typeface="Times New Roman" pitchFamily="18" charset="0"/>
               </a:rPr>
-              <a:t>in a registered user</a:t>
+              <a:t>Display another user's profile</a:t>
             </a:r>
           </a:p>
           <a:p>
@@ -9868,70 +9938,28 @@
                 <a:latin typeface="Times New Roman" pitchFamily="18" charset="0"/>
                 <a:cs typeface="Times New Roman" pitchFamily="18" charset="0"/>
               </a:rPr>
-              <a:t>D</a:t>
-            </a:r>
-            <a:r>
-              <a:rPr lang="en-US" sz="1800" dirty="0" smtClean="0">
-                <a:effectLst/>
-                <a:latin typeface="Times New Roman" pitchFamily="18" charset="0"/>
-                <a:cs typeface="Times New Roman" pitchFamily="18" charset="0"/>
-              </a:rPr>
-              <a:t>isplay </a:t>
-            </a:r>
+              <a:t>Send friend requests</a:t>
+            </a:r>
+          </a:p>
+          <a:p>
             <a:r>
               <a:rPr lang="en-US" sz="1800" dirty="0">
                 <a:effectLst/>
                 <a:latin typeface="Times New Roman" pitchFamily="18" charset="0"/>
                 <a:cs typeface="Times New Roman" pitchFamily="18" charset="0"/>
               </a:rPr>
-              <a:t>another user's profile</a:t>
-            </a:r>
-          </a:p>
-          <a:p>
-            <a:r>
-              <a:rPr lang="en-US" sz="1800" dirty="0" smtClean="0">
-                <a:effectLst/>
-                <a:latin typeface="Times New Roman" pitchFamily="18" charset="0"/>
-                <a:cs typeface="Times New Roman" pitchFamily="18" charset="0"/>
-              </a:rPr>
-              <a:t>Send friend requests</a:t>
-            </a:r>
-            <a:endParaRPr lang="en-US" sz="1800" dirty="0">
-              <a:effectLst/>
-              <a:latin typeface="Times New Roman" pitchFamily="18" charset="0"/>
-              <a:cs typeface="Times New Roman" pitchFamily="18" charset="0"/>
-            </a:endParaRPr>
-          </a:p>
-          <a:p>
-            <a:r>
-              <a:rPr lang="en-US" sz="1800" dirty="0" smtClean="0">
-                <a:effectLst/>
-                <a:latin typeface="Times New Roman" pitchFamily="18" charset="0"/>
-                <a:cs typeface="Times New Roman" pitchFamily="18" charset="0"/>
-              </a:rPr>
-              <a:t>Create, edit, comment </a:t>
-            </a:r>
+              <a:t>Create, edit, comment on any post that is visible.</a:t>
+            </a:r>
+          </a:p>
+          <a:p>
             <a:r>
               <a:rPr lang="en-US" sz="1800" dirty="0">
                 <a:effectLst/>
                 <a:latin typeface="Times New Roman" pitchFamily="18" charset="0"/>
                 <a:cs typeface="Times New Roman" pitchFamily="18" charset="0"/>
               </a:rPr>
-              <a:t>on any post </a:t>
-            </a:r>
-            <a:r>
-              <a:rPr lang="en-US" sz="1800" dirty="0" smtClean="0">
-                <a:effectLst/>
-                <a:latin typeface="Times New Roman" pitchFamily="18" charset="0"/>
-                <a:cs typeface="Times New Roman" pitchFamily="18" charset="0"/>
-              </a:rPr>
-              <a:t>that is visible.</a:t>
-            </a:r>
-            <a:endParaRPr lang="en-US" sz="1800" dirty="0">
-              <a:effectLst/>
-              <a:latin typeface="Times New Roman" pitchFamily="18" charset="0"/>
-              <a:cs typeface="Times New Roman" pitchFamily="18" charset="0"/>
-            </a:endParaRPr>
+              <a:t>Create , edit, join groups</a:t>
+            </a:r>
           </a:p>
           <a:p>
             <a:r>
@@ -9940,23 +9968,17 @@
                 <a:latin typeface="Times New Roman" pitchFamily="18" charset="0"/>
                 <a:cs typeface="Times New Roman" pitchFamily="18" charset="0"/>
               </a:rPr>
-              <a:t>C</a:t>
-            </a:r>
-            <a:r>
-              <a:rPr lang="en-US" sz="1800" dirty="0" smtClean="0">
-                <a:effectLst/>
-                <a:latin typeface="Times New Roman" pitchFamily="18" charset="0"/>
-                <a:cs typeface="Times New Roman" pitchFamily="18" charset="0"/>
-              </a:rPr>
-              <a:t>reate , edit, join </a:t>
-            </a:r>
+              <a:t>Create a course schedule</a:t>
+            </a:r>
+          </a:p>
+          <a:p>
             <a:r>
               <a:rPr lang="en-US" sz="1800" dirty="0">
                 <a:effectLst/>
                 <a:latin typeface="Times New Roman" pitchFamily="18" charset="0"/>
                 <a:cs typeface="Times New Roman" pitchFamily="18" charset="0"/>
               </a:rPr>
-              <a:t>groups</a:t>
+              <a:t>Allow users to upload a resume</a:t>
             </a:r>
           </a:p>
           <a:p>
@@ -9966,131 +9988,18 @@
                 <a:latin typeface="Times New Roman" pitchFamily="18" charset="0"/>
                 <a:cs typeface="Times New Roman" pitchFamily="18" charset="0"/>
               </a:rPr>
-              <a:t>C</a:t>
-            </a:r>
-            <a:r>
-              <a:rPr lang="en-US" sz="1800" dirty="0" smtClean="0">
-                <a:effectLst/>
-                <a:latin typeface="Times New Roman" pitchFamily="18" charset="0"/>
-                <a:cs typeface="Times New Roman" pitchFamily="18" charset="0"/>
-              </a:rPr>
-              <a:t>reate </a:t>
-            </a:r>
+              <a:t>Maintain lost and found section, allow users to create posts within it</a:t>
+            </a:r>
+          </a:p>
+          <a:p>
             <a:r>
               <a:rPr lang="en-US" sz="1800" dirty="0">
                 <a:effectLst/>
                 <a:latin typeface="Times New Roman" pitchFamily="18" charset="0"/>
                 <a:cs typeface="Times New Roman" pitchFamily="18" charset="0"/>
               </a:rPr>
-              <a:t>a course </a:t>
-            </a:r>
-            <a:r>
-              <a:rPr lang="en-US" sz="1800" dirty="0" smtClean="0">
-                <a:effectLst/>
-                <a:latin typeface="Times New Roman" pitchFamily="18" charset="0"/>
-                <a:cs typeface="Times New Roman" pitchFamily="18" charset="0"/>
-              </a:rPr>
-              <a:t>schedule</a:t>
-            </a:r>
-          </a:p>
-          <a:p>
-            <a:r>
-              <a:rPr lang="en-US" sz="1800" dirty="0">
-                <a:effectLst/>
-                <a:latin typeface="Times New Roman" pitchFamily="18" charset="0"/>
-                <a:cs typeface="Times New Roman" pitchFamily="18" charset="0"/>
-              </a:rPr>
-              <a:t>A</a:t>
-            </a:r>
-            <a:r>
-              <a:rPr lang="en-US" sz="1800" dirty="0" smtClean="0">
-                <a:effectLst/>
-                <a:latin typeface="Times New Roman" pitchFamily="18" charset="0"/>
-                <a:cs typeface="Times New Roman" pitchFamily="18" charset="0"/>
-              </a:rPr>
-              <a:t>llow </a:t>
-            </a:r>
-            <a:r>
-              <a:rPr lang="en-US" sz="1800" dirty="0">
-                <a:effectLst/>
-                <a:latin typeface="Times New Roman" pitchFamily="18" charset="0"/>
-                <a:cs typeface="Times New Roman" pitchFamily="18" charset="0"/>
-              </a:rPr>
-              <a:t>users to upload a resume</a:t>
-            </a:r>
-          </a:p>
-          <a:p>
-            <a:r>
-              <a:rPr lang="en-US" sz="1800" dirty="0">
-                <a:effectLst/>
-                <a:latin typeface="Times New Roman" pitchFamily="18" charset="0"/>
-                <a:cs typeface="Times New Roman" pitchFamily="18" charset="0"/>
-              </a:rPr>
-              <a:t>M</a:t>
-            </a:r>
-            <a:r>
-              <a:rPr lang="en-US" sz="1800" dirty="0" smtClean="0">
-                <a:effectLst/>
-                <a:latin typeface="Times New Roman" pitchFamily="18" charset="0"/>
-                <a:cs typeface="Times New Roman" pitchFamily="18" charset="0"/>
-              </a:rPr>
-              <a:t>aintain </a:t>
-            </a:r>
-            <a:r>
-              <a:rPr lang="en-US" sz="1800" dirty="0">
-                <a:effectLst/>
-                <a:latin typeface="Times New Roman" pitchFamily="18" charset="0"/>
-                <a:cs typeface="Times New Roman" pitchFamily="18" charset="0"/>
-              </a:rPr>
-              <a:t>lost and found section, allow users to create posts within it</a:t>
-            </a:r>
-          </a:p>
-          <a:p>
-            <a:r>
-              <a:rPr lang="en-US" sz="1800" dirty="0" smtClean="0">
-                <a:effectLst/>
-                <a:latin typeface="Times New Roman" pitchFamily="18" charset="0"/>
-                <a:cs typeface="Times New Roman" pitchFamily="18" charset="0"/>
-              </a:rPr>
-              <a:t>Create, delete polls</a:t>
-            </a:r>
-            <a:r>
-              <a:rPr lang="en-US" sz="1800" dirty="0">
-                <a:effectLst/>
-                <a:latin typeface="Times New Roman" pitchFamily="18" charset="0"/>
-                <a:cs typeface="Times New Roman" pitchFamily="18" charset="0"/>
-              </a:rPr>
-              <a:t> </a:t>
-            </a:r>
-            <a:r>
-              <a:rPr lang="en-US" sz="1800" dirty="0" smtClean="0">
-                <a:effectLst/>
-                <a:latin typeface="Times New Roman" pitchFamily="18" charset="0"/>
-                <a:cs typeface="Times New Roman" pitchFamily="18" charset="0"/>
-              </a:rPr>
-              <a:t>&amp; vote </a:t>
-            </a:r>
-            <a:r>
-              <a:rPr lang="en-US" sz="1800" dirty="0">
-                <a:effectLst/>
-                <a:latin typeface="Times New Roman" pitchFamily="18" charset="0"/>
-                <a:cs typeface="Times New Roman" pitchFamily="18" charset="0"/>
-              </a:rPr>
-              <a:t>on </a:t>
-            </a:r>
-            <a:r>
-              <a:rPr lang="en-US" sz="1800" dirty="0" smtClean="0">
-                <a:effectLst/>
-                <a:latin typeface="Times New Roman" pitchFamily="18" charset="0"/>
-                <a:cs typeface="Times New Roman" pitchFamily="18" charset="0"/>
-              </a:rPr>
-              <a:t>polls</a:t>
-            </a:r>
-            <a:endParaRPr lang="en-US" sz="1800" dirty="0">
-              <a:effectLst/>
-              <a:latin typeface="Times New Roman" pitchFamily="18" charset="0"/>
-              <a:cs typeface="Times New Roman" pitchFamily="18" charset="0"/>
-            </a:endParaRPr>
+              <a:t>Create, delete polls &amp; vote on polls</a:t>
+            </a:r>
           </a:p>
         </p:txBody>
       </p:sp>
@@ -10106,8 +10015,8 @@
         </p:nvSpPr>
         <p:spPr>
           <a:xfrm>
-            <a:off x="4953000" y="1828800"/>
-            <a:ext cx="3273552" cy="3432175"/>
+            <a:off x="4897902" y="1538068"/>
+            <a:ext cx="3273552" cy="3962400"/>
           </a:xfrm>
         </p:spPr>
         <p:txBody>
@@ -10116,26 +10025,15 @@
           </a:bodyPr>
           <a:lstStyle/>
           <a:p>
-            <a:r>
-              <a:rPr lang="en-US" sz="1800" dirty="0" smtClean="0">
-                <a:latin typeface="Times New Roman" pitchFamily="18" charset="0"/>
-                <a:cs typeface="Times New Roman" pitchFamily="18" charset="0"/>
-              </a:rPr>
-              <a:t>Each </a:t>
-            </a:r>
+            <a:pPr marL="0" indent="0" algn="ctr">
+              <a:buNone/>
+            </a:pPr>
             <a:r>
               <a:rPr lang="en-US" sz="1800" dirty="0">
                 <a:latin typeface="Times New Roman" pitchFamily="18" charset="0"/>
                 <a:cs typeface="Times New Roman" pitchFamily="18" charset="0"/>
               </a:rPr>
-              <a:t>user has to have a valid email address that ends with </a:t>
-            </a:r>
-            <a:r>
-              <a:rPr lang="en-US" sz="1800" dirty="0" smtClean="0">
-                <a:latin typeface="Times New Roman" pitchFamily="18" charset="0"/>
-                <a:cs typeface="Times New Roman" pitchFamily="18" charset="0"/>
-              </a:rPr>
-              <a:t>mun.ca</a:t>
+              <a:t>Constraints:</a:t>
             </a:r>
           </a:p>
           <a:p>
@@ -10144,14 +10042,16 @@
                 <a:latin typeface="Times New Roman" pitchFamily="18" charset="0"/>
                 <a:cs typeface="Times New Roman" pitchFamily="18" charset="0"/>
               </a:rPr>
-              <a:t>Every user has privacy </a:t>
-            </a:r>
-            <a:r>
-              <a:rPr lang="en-US" sz="1800" dirty="0" smtClean="0">
+              <a:t>Each user has to have a valid email address that ends with mun.ca</a:t>
+            </a:r>
+          </a:p>
+          <a:p>
+            <a:r>
+              <a:rPr lang="en-US" sz="1800" dirty="0">
                 <a:latin typeface="Times New Roman" pitchFamily="18" charset="0"/>
                 <a:cs typeface="Times New Roman" pitchFamily="18" charset="0"/>
               </a:rPr>
-              <a:t>restrictions</a:t>
+              <a:t>Every user has privacy restrictions</a:t>
             </a:r>
           </a:p>
           <a:p>
@@ -10161,15 +10061,7 @@
                 <a:latin typeface="Times New Roman" pitchFamily="18" charset="0"/>
                 <a:cs typeface="Times New Roman" pitchFamily="18" charset="0"/>
               </a:rPr>
-              <a:t>Project is web-based and will be hosted on the university </a:t>
-            </a:r>
-            <a:r>
-              <a:rPr lang="en-US" sz="1800" dirty="0" smtClean="0">
-                <a:effectLst/>
-                <a:latin typeface="Times New Roman" pitchFamily="18" charset="0"/>
-                <a:cs typeface="Times New Roman" pitchFamily="18" charset="0"/>
-              </a:rPr>
-              <a:t>server</a:t>
+              <a:t>Project is web-based and will be hosted on the university server</a:t>
             </a:r>
           </a:p>
           <a:p>
@@ -10179,15 +10071,7 @@
                 <a:latin typeface="Times New Roman" pitchFamily="18" charset="0"/>
                 <a:cs typeface="Times New Roman" pitchFamily="18" charset="0"/>
               </a:rPr>
-              <a:t>It is currently assumed that it is only viewed on a personal computer and not on any mobile </a:t>
-            </a:r>
-            <a:r>
-              <a:rPr lang="en-US" sz="1800" dirty="0" smtClean="0">
-                <a:effectLst/>
-                <a:latin typeface="Times New Roman" pitchFamily="18" charset="0"/>
-                <a:cs typeface="Times New Roman" pitchFamily="18" charset="0"/>
-              </a:rPr>
-              <a:t>environment.</a:t>
+              <a:t>It is currently assumed that it is only viewed on a personal computer and not on any mobile environment.</a:t>
             </a:r>
             <a:endParaRPr lang="en-US" sz="1800" dirty="0">
               <a:latin typeface="Times New Roman" pitchFamily="18" charset="0"/>
@@ -10206,13 +10090,6 @@
   <p:clrMapOvr>
     <a:masterClrMapping/>
   </p:clrMapOvr>
-  <p:timing>
-    <p:tnLst>
-      <p:par>
-        <p:cTn id="1" dur="indefinite" restart="never" nodeType="tmRoot"/>
-      </p:par>
-    </p:tnLst>
-  </p:timing>
 </p:sld>
 </file>
 
@@ -10256,10 +10133,9 @@
           <a:lstStyle/>
           <a:p>
             <a:r>
-              <a:rPr lang="en-US" sz="3200" dirty="0" smtClean="0"/>
+              <a:rPr lang="en-US" sz="3200" dirty="0"/>
               <a:t>REQUIREMENTS</a:t>
             </a:r>
-            <a:endParaRPr lang="en-US" sz="3200" dirty="0"/>
           </a:p>
         </p:txBody>
       </p:sp>
@@ -10289,7 +10165,7 @@
               <a:buNone/>
             </a:pPr>
             <a:r>
-              <a:rPr lang="en-US" sz="2400" b="1" dirty="0" smtClean="0">
+              <a:rPr lang="en-US" sz="2400" b="1" dirty="0">
                 <a:effectLst/>
                 <a:latin typeface="Times New Roman" pitchFamily="18" charset="0"/>
                 <a:cs typeface="Times New Roman" pitchFamily="18" charset="0"/>
@@ -10303,44 +10179,12 @@
               <a:buChar char="•"/>
             </a:pPr>
             <a:r>
-              <a:rPr lang="en-US" sz="1800" dirty="0" smtClean="0">
-                <a:effectLst/>
-                <a:latin typeface="Times New Roman" pitchFamily="18" charset="0"/>
-                <a:cs typeface="Times New Roman" pitchFamily="18" charset="0"/>
-              </a:rPr>
-              <a:t>First </a:t>
-            </a:r>
-            <a:r>
               <a:rPr lang="en-US" sz="1800" dirty="0">
                 <a:effectLst/>
                 <a:latin typeface="Times New Roman" pitchFamily="18" charset="0"/>
                 <a:cs typeface="Times New Roman" pitchFamily="18" charset="0"/>
               </a:rPr>
-              <a:t>interface will be our login </a:t>
-            </a:r>
-            <a:r>
-              <a:rPr lang="en-US" sz="1800" dirty="0" smtClean="0">
-                <a:effectLst/>
-                <a:latin typeface="Times New Roman" pitchFamily="18" charset="0"/>
-                <a:cs typeface="Times New Roman" pitchFamily="18" charset="0"/>
-              </a:rPr>
-              <a:t>screen to </a:t>
-            </a:r>
-            <a:r>
-              <a:rPr lang="en-US" sz="1800" dirty="0">
-                <a:effectLst/>
-                <a:latin typeface="Times New Roman" pitchFamily="18" charset="0"/>
-                <a:cs typeface="Times New Roman" pitchFamily="18" charset="0"/>
-              </a:rPr>
-              <a:t>input their username </a:t>
-            </a:r>
-            <a:r>
-              <a:rPr lang="en-US" sz="1800" dirty="0" smtClean="0">
-                <a:effectLst/>
-                <a:latin typeface="Times New Roman" pitchFamily="18" charset="0"/>
-                <a:cs typeface="Times New Roman" pitchFamily="18" charset="0"/>
-              </a:rPr>
-              <a:t>and password.</a:t>
+              <a:t>First interface will be our login screen to input their username and password.</a:t>
             </a:r>
           </a:p>
           <a:p>
@@ -10349,7 +10193,7 @@
               <a:buChar char="•"/>
             </a:pPr>
             <a:r>
-              <a:rPr lang="en-US" sz="1800" dirty="0" smtClean="0">
+              <a:rPr lang="en-US" sz="1800" dirty="0">
                 <a:effectLst/>
                 <a:latin typeface="Times New Roman" pitchFamily="18" charset="0"/>
                 <a:cs typeface="Times New Roman" pitchFamily="18" charset="0"/>
@@ -10377,15 +10221,7 @@
                 <a:latin typeface="Times New Roman" pitchFamily="18" charset="0"/>
                 <a:cs typeface="Times New Roman" pitchFamily="18" charset="0"/>
               </a:rPr>
-              <a:t>Hardware </a:t>
-            </a:r>
-            <a:r>
-              <a:rPr lang="en-US" sz="2400" b="1" dirty="0" smtClean="0">
-                <a:effectLst/>
-                <a:latin typeface="Times New Roman" pitchFamily="18" charset="0"/>
-                <a:cs typeface="Times New Roman" pitchFamily="18" charset="0"/>
-              </a:rPr>
-              <a:t>Interfaces:</a:t>
+              <a:t>Hardware Interfaces:</a:t>
             </a:r>
           </a:p>
           <a:p>
@@ -10394,7 +10230,7 @@
               <a:buChar char="•"/>
             </a:pPr>
             <a:r>
-              <a:rPr lang="en-US" sz="1800" dirty="0" smtClean="0">
+              <a:rPr lang="en-US" sz="1800" dirty="0">
                 <a:effectLst/>
                 <a:latin typeface="Times New Roman" pitchFamily="18" charset="0"/>
                 <a:cs typeface="Times New Roman" pitchFamily="18" charset="0"/>
@@ -10408,18 +10244,13 @@
               <a:buChar char="•"/>
             </a:pPr>
             <a:r>
-              <a:rPr lang="en-US" sz="1800" dirty="0" smtClean="0">
+              <a:rPr lang="en-US" sz="1800" dirty="0">
                 <a:effectLst/>
                 <a:latin typeface="Times New Roman" pitchFamily="18" charset="0"/>
                 <a:cs typeface="Times New Roman" pitchFamily="18" charset="0"/>
               </a:rPr>
               <a:t>Network interaction will use https</a:t>
             </a:r>
-            <a:endParaRPr lang="en-US" sz="1800" dirty="0">
-              <a:effectLst/>
-              <a:latin typeface="Times New Roman" pitchFamily="18" charset="0"/>
-              <a:cs typeface="Times New Roman" pitchFamily="18" charset="0"/>
-            </a:endParaRPr>
           </a:p>
           <a:p>
             <a:pPr marL="18288" indent="0">
@@ -10436,18 +10267,13 @@
               <a:buNone/>
             </a:pPr>
             <a:r>
-              <a:rPr lang="en-US" sz="2400" b="1" dirty="0" smtClean="0">
+              <a:rPr lang="en-US" sz="2400" b="1" dirty="0">
                 <a:effectLst/>
                 <a:latin typeface="Times New Roman" pitchFamily="18" charset="0"/>
                 <a:cs typeface="Times New Roman" pitchFamily="18" charset="0"/>
               </a:rPr>
               <a:t>Software Interfaces</a:t>
             </a:r>
-            <a:endParaRPr lang="en-US" sz="2400" b="1" dirty="0">
-              <a:effectLst/>
-              <a:latin typeface="Times New Roman" pitchFamily="18" charset="0"/>
-              <a:cs typeface="Times New Roman" pitchFamily="18" charset="0"/>
-            </a:endParaRPr>
           </a:p>
           <a:p>
             <a:pPr>
@@ -10455,7 +10281,7 @@
               <a:buChar char="•"/>
             </a:pPr>
             <a:r>
-              <a:rPr lang="de-DE" sz="1800" dirty="0" smtClean="0">
+              <a:rPr lang="de-DE" sz="1800" dirty="0">
                 <a:effectLst/>
                 <a:latin typeface="Times New Roman" pitchFamily="18" charset="0"/>
                 <a:cs typeface="Times New Roman" pitchFamily="18" charset="0"/>
@@ -10469,7 +10295,7 @@
               <a:buChar char="•"/>
             </a:pPr>
             <a:r>
-              <a:rPr lang="de-DE" sz="1800" dirty="0" smtClean="0">
+              <a:rPr lang="de-DE" sz="1800" dirty="0">
                 <a:effectLst/>
                 <a:latin typeface="Times New Roman" pitchFamily="18" charset="0"/>
                 <a:cs typeface="Times New Roman" pitchFamily="18" charset="0"/>
@@ -10483,7 +10309,7 @@
               <a:buChar char="•"/>
             </a:pPr>
             <a:r>
-              <a:rPr lang="de-DE" sz="1800" dirty="0" smtClean="0">
+              <a:rPr lang="de-DE" sz="1800" dirty="0">
                 <a:effectLst/>
                 <a:latin typeface="Times New Roman" pitchFamily="18" charset="0"/>
                 <a:cs typeface="Times New Roman" pitchFamily="18" charset="0"/>
@@ -10497,7 +10323,7 @@
               <a:buChar char="•"/>
             </a:pPr>
             <a:r>
-              <a:rPr lang="de-DE" sz="1800" dirty="0" smtClean="0">
+              <a:rPr lang="de-DE" sz="1800" dirty="0">
                 <a:effectLst/>
                 <a:latin typeface="Times New Roman" pitchFamily="18" charset="0"/>
                 <a:cs typeface="Times New Roman" pitchFamily="18" charset="0"/>
@@ -10523,13 +10349,6 @@
   <p:clrMapOvr>
     <a:masterClrMapping/>
   </p:clrMapOvr>
-  <p:timing>
-    <p:tnLst>
-      <p:par>
-        <p:cTn id="1" dur="indefinite" restart="never" nodeType="tmRoot"/>
-      </p:par>
-    </p:tnLst>
-  </p:timing>
 </p:sld>
 </file>
 
@@ -10571,10 +10390,9 @@
           <a:lstStyle/>
           <a:p>
             <a:r>
-              <a:rPr lang="en-US" sz="3200" dirty="0" smtClean="0"/>
+              <a:rPr lang="en-US" sz="3200" dirty="0"/>
               <a:t>Functional Requirements</a:t>
             </a:r>
-            <a:endParaRPr lang="en-US" sz="3200" dirty="0"/>
           </a:p>
         </p:txBody>
       </p:sp>
@@ -10616,15 +10434,7 @@
                 <a:latin typeface="Times New Roman" pitchFamily="18" charset="0"/>
                 <a:cs typeface="Times New Roman" pitchFamily="18" charset="0"/>
               </a:rPr>
-              <a:t>User Signs </a:t>
-            </a:r>
-            <a:r>
-              <a:rPr lang="en-US" sz="1800" dirty="0" smtClean="0">
-                <a:effectLst/>
-                <a:latin typeface="Times New Roman" pitchFamily="18" charset="0"/>
-                <a:cs typeface="Times New Roman" pitchFamily="18" charset="0"/>
-              </a:rPr>
-              <a:t>In</a:t>
+              <a:t>User Signs In</a:t>
             </a:r>
           </a:p>
           <a:p>
@@ -10654,15 +10464,7 @@
                 <a:latin typeface="Times New Roman" pitchFamily="18" charset="0"/>
                 <a:cs typeface="Times New Roman" pitchFamily="18" charset="0"/>
               </a:rPr>
-              <a:t>User Creates a </a:t>
-            </a:r>
-            <a:r>
-              <a:rPr lang="en-US" sz="1800" dirty="0" smtClean="0">
-                <a:effectLst/>
-                <a:latin typeface="Times New Roman" pitchFamily="18" charset="0"/>
-                <a:cs typeface="Times New Roman" pitchFamily="18" charset="0"/>
-              </a:rPr>
-              <a:t>Post</a:t>
+              <a:t>User Creates a Post</a:t>
             </a:r>
           </a:p>
           <a:p>
@@ -10672,15 +10474,7 @@
                 <a:latin typeface="Times New Roman" pitchFamily="18" charset="0"/>
                 <a:cs typeface="Times New Roman" pitchFamily="18" charset="0"/>
               </a:rPr>
-              <a:t>User Edits the Visibility of a </a:t>
-            </a:r>
-            <a:r>
-              <a:rPr lang="en-US" sz="1800" dirty="0" smtClean="0">
-                <a:effectLst/>
-                <a:latin typeface="Times New Roman" pitchFamily="18" charset="0"/>
-                <a:cs typeface="Times New Roman" pitchFamily="18" charset="0"/>
-              </a:rPr>
-              <a:t>Post</a:t>
+              <a:t>User Edits the Visibility of a Post</a:t>
             </a:r>
           </a:p>
           <a:p>
@@ -10690,21 +10484,8 @@
                 <a:latin typeface="Times New Roman" pitchFamily="18" charset="0"/>
                 <a:cs typeface="Times New Roman" pitchFamily="18" charset="0"/>
               </a:rPr>
-              <a:t>User Makes a Comment on a </a:t>
-            </a:r>
-            <a:r>
-              <a:rPr lang="en-US" sz="1800" dirty="0" smtClean="0">
-                <a:effectLst/>
-                <a:latin typeface="Times New Roman" pitchFamily="18" charset="0"/>
-                <a:cs typeface="Times New Roman" pitchFamily="18" charset="0"/>
-              </a:rPr>
-              <a:t>Post</a:t>
-            </a:r>
-            <a:endParaRPr lang="en-US" sz="1800" dirty="0">
-              <a:effectLst/>
-              <a:latin typeface="Times New Roman" pitchFamily="18" charset="0"/>
-              <a:cs typeface="Times New Roman" pitchFamily="18" charset="0"/>
-            </a:endParaRPr>
+              <a:t>User Makes a Comment on a Post</a:t>
+            </a:r>
           </a:p>
         </p:txBody>
       </p:sp>
@@ -10756,15 +10537,7 @@
                 <a:latin typeface="Times New Roman" pitchFamily="18" charset="0"/>
                 <a:cs typeface="Times New Roman" pitchFamily="18" charset="0"/>
               </a:rPr>
-              <a:t>User Creates a </a:t>
-            </a:r>
-            <a:r>
-              <a:rPr lang="en-US" sz="1800" dirty="0" smtClean="0">
-                <a:effectLst/>
-                <a:latin typeface="Times New Roman" pitchFamily="18" charset="0"/>
-                <a:cs typeface="Times New Roman" pitchFamily="18" charset="0"/>
-              </a:rPr>
-              <a:t>Schedule</a:t>
+              <a:t>User Creates a Schedule</a:t>
             </a:r>
           </a:p>
           <a:p>
@@ -10774,17 +10547,9 @@
                 <a:latin typeface="Times New Roman" pitchFamily="18" charset="0"/>
                 <a:cs typeface="Times New Roman" pitchFamily="18" charset="0"/>
               </a:rPr>
-              <a:t>User Uploads a </a:t>
-            </a:r>
-            <a:r>
-              <a:rPr lang="en-US" sz="1800" dirty="0" smtClean="0">
-                <a:effectLst/>
-                <a:latin typeface="Times New Roman" pitchFamily="18" charset="0"/>
-                <a:cs typeface="Times New Roman" pitchFamily="18" charset="0"/>
-              </a:rPr>
-              <a:t>Resume</a:t>
-            </a:r>
-            <a:endParaRPr lang="fr-FR" sz="1800" dirty="0" smtClean="0">
+              <a:t>User Uploads a Resume</a:t>
+            </a:r>
+            <a:endParaRPr lang="fr-FR" sz="1800" dirty="0">
               <a:effectLst/>
               <a:latin typeface="Times New Roman" pitchFamily="18" charset="0"/>
               <a:cs typeface="Times New Roman" pitchFamily="18" charset="0"/>
@@ -10797,15 +10562,7 @@
                 <a:latin typeface="Times New Roman" pitchFamily="18" charset="0"/>
                 <a:cs typeface="Times New Roman" pitchFamily="18" charset="0"/>
               </a:rPr>
-              <a:t>User Adds Item to Lost and </a:t>
-            </a:r>
-            <a:r>
-              <a:rPr lang="en-US" sz="1800" dirty="0" smtClean="0">
-                <a:effectLst/>
-                <a:latin typeface="Times New Roman" pitchFamily="18" charset="0"/>
-                <a:cs typeface="Times New Roman" pitchFamily="18" charset="0"/>
-              </a:rPr>
-              <a:t>Found</a:t>
+              <a:t>User Adds Item to Lost and Found</a:t>
             </a:r>
           </a:p>
           <a:p>
@@ -10841,15 +10598,7 @@
                 <a:latin typeface="Times New Roman" pitchFamily="18" charset="0"/>
                 <a:cs typeface="Times New Roman" pitchFamily="18" charset="0"/>
               </a:rPr>
-              <a:t>User Creates a </a:t>
-            </a:r>
-            <a:r>
-              <a:rPr lang="en-US" sz="1800" dirty="0" smtClean="0">
-                <a:effectLst/>
-                <a:latin typeface="Times New Roman" pitchFamily="18" charset="0"/>
-                <a:cs typeface="Times New Roman" pitchFamily="18" charset="0"/>
-              </a:rPr>
-              <a:t>Poll</a:t>
+              <a:t>User Creates a Poll</a:t>
             </a:r>
           </a:p>
           <a:p>
@@ -10878,13 +10627,6 @@
   <p:clrMapOvr>
     <a:masterClrMapping/>
   </p:clrMapOvr>
-  <p:timing>
-    <p:tnLst>
-      <p:par>
-        <p:cTn id="1" dur="indefinite" restart="never" nodeType="tmRoot"/>
-      </p:par>
-    </p:tnLst>
-  </p:timing>
 </p:sld>
 </file>
 
@@ -10927,10 +10669,9 @@
           <a:p>
             <a:pPr algn="ctr"/>
             <a:r>
-              <a:rPr lang="en-US" sz="3200" dirty="0" smtClean="0"/>
+              <a:rPr lang="en-US" sz="3200" dirty="0"/>
               <a:t>USE CASE DIAGRAM</a:t>
             </a:r>
-            <a:endParaRPr lang="en-US" sz="3200" dirty="0"/>
           </a:p>
         </p:txBody>
       </p:sp>
@@ -10985,13 +10726,6 @@
   <p:clrMapOvr>
     <a:masterClrMapping/>
   </p:clrMapOvr>
-  <p:timing>
-    <p:tnLst>
-      <p:par>
-        <p:cTn id="1" dur="indefinite" restart="never" nodeType="tmRoot"/>
-      </p:par>
-    </p:tnLst>
-  </p:timing>
 </p:sld>
 </file>
 
@@ -11034,10 +10768,9 @@
           <a:p>
             <a:pPr algn="ctr"/>
             <a:r>
-              <a:rPr lang="en-US" sz="3200" dirty="0" smtClean="0"/>
+              <a:rPr lang="en-US" sz="3200" dirty="0"/>
               <a:t>USE CASE DIAGRAM</a:t>
             </a:r>
-            <a:endParaRPr lang="en-US" sz="3200" dirty="0"/>
           </a:p>
         </p:txBody>
       </p:sp>
@@ -11092,13 +10825,6 @@
   <p:clrMapOvr>
     <a:masterClrMapping/>
   </p:clrMapOvr>
-  <p:timing>
-    <p:tnLst>
-      <p:par>
-        <p:cTn id="1" dur="indefinite" restart="never" nodeType="tmRoot"/>
-      </p:par>
-    </p:tnLst>
-  </p:timing>
 </p:sld>
 </file>
 
@@ -11141,10 +10867,9 @@
           <a:p>
             <a:pPr algn="ctr"/>
             <a:r>
-              <a:rPr lang="en-US" sz="3200" dirty="0" smtClean="0"/>
+              <a:rPr lang="en-US" sz="3200" dirty="0"/>
               <a:t>USE CASE DIAGRAM</a:t>
             </a:r>
-            <a:endParaRPr lang="en-US" sz="3200" dirty="0"/>
           </a:p>
         </p:txBody>
       </p:sp>
@@ -11199,13 +10924,6 @@
   <p:clrMapOvr>
     <a:masterClrMapping/>
   </p:clrMapOvr>
-  <p:timing>
-    <p:tnLst>
-      <p:par>
-        <p:cTn id="1" dur="indefinite" restart="never" nodeType="tmRoot"/>
-      </p:par>
-    </p:tnLst>
-  </p:timing>
 </p:sld>
 </file>
 
@@ -11236,21 +10954,15 @@
             <p:ph type="title"/>
           </p:nvPr>
         </p:nvSpPr>
-        <p:spPr>
-          <a:xfrm>
-            <a:off x="1066800" y="228600"/>
-            <a:ext cx="7543800" cy="914400"/>
-          </a:xfrm>
-        </p:spPr>
+        <p:spPr/>
         <p:txBody>
           <a:bodyPr/>
           <a:lstStyle/>
           <a:p>
             <a:r>
-              <a:rPr lang="en-US" sz="3200" dirty="0" smtClean="0"/>
+              <a:rPr lang="en-US" sz="3200" dirty="0"/>
               <a:t>Non- Functional Requirements</a:t>
             </a:r>
-            <a:endParaRPr lang="en-US" sz="3200" dirty="0"/>
           </a:p>
         </p:txBody>
       </p:sp>
@@ -11261,15 +10973,10 @@
             <a:spLocks noGrp="1"/>
           </p:cNvSpPr>
           <p:nvPr>
-            <p:ph sz="half" idx="1"/>
+            <p:ph idx="1"/>
           </p:nvPr>
         </p:nvSpPr>
-        <p:spPr>
-          <a:xfrm>
-            <a:off x="1066800" y="1828800"/>
-            <a:ext cx="3578352" cy="4038600"/>
-          </a:xfrm>
-        </p:spPr>
+        <p:spPr/>
         <p:txBody>
           <a:bodyPr>
             <a:normAutofit/>
@@ -11277,269 +10984,79 @@
           <a:lstStyle/>
           <a:p>
             <a:r>
-              <a:rPr lang="en-US" sz="1800" dirty="0">
-                <a:effectLst/>
-                <a:latin typeface="Times New Roman" pitchFamily="18" charset="0"/>
-                <a:cs typeface="Times New Roman" pitchFamily="18" charset="0"/>
-              </a:rPr>
-              <a:t>User Creates a Profile</a:t>
-            </a:r>
-          </a:p>
-          <a:p>
-            <a:r>
-              <a:rPr lang="en-US" sz="1800" dirty="0">
-                <a:effectLst/>
-                <a:latin typeface="Times New Roman" pitchFamily="18" charset="0"/>
-                <a:cs typeface="Times New Roman" pitchFamily="18" charset="0"/>
-              </a:rPr>
-              <a:t>User Signs </a:t>
-            </a:r>
-            <a:r>
-              <a:rPr lang="en-US" sz="1800" dirty="0" smtClean="0">
-                <a:effectLst/>
-                <a:latin typeface="Times New Roman" pitchFamily="18" charset="0"/>
-                <a:cs typeface="Times New Roman" pitchFamily="18" charset="0"/>
-              </a:rPr>
-              <a:t>In</a:t>
-            </a:r>
-          </a:p>
-          <a:p>
-            <a:r>
-              <a:rPr lang="en-US" sz="1800" dirty="0">
-                <a:effectLst/>
-                <a:latin typeface="Times New Roman" pitchFamily="18" charset="0"/>
-                <a:cs typeface="Times New Roman" pitchFamily="18" charset="0"/>
-              </a:rPr>
-              <a:t>User Accesses Another User’s Profile</a:t>
-            </a:r>
-          </a:p>
-          <a:p>
-            <a:r>
-              <a:rPr lang="en-US" sz="1800" dirty="0">
-                <a:effectLst/>
-                <a:latin typeface="Times New Roman" pitchFamily="18" charset="0"/>
-                <a:cs typeface="Times New Roman" pitchFamily="18" charset="0"/>
-              </a:rPr>
-              <a:t>User Adds a Friend</a:t>
-            </a:r>
-          </a:p>
-          <a:p>
-            <a:r>
-              <a:rPr lang="en-US" sz="1800" dirty="0">
-                <a:effectLst/>
-                <a:latin typeface="Times New Roman" pitchFamily="18" charset="0"/>
-                <a:cs typeface="Times New Roman" pitchFamily="18" charset="0"/>
-              </a:rPr>
-              <a:t>User Creates a </a:t>
-            </a:r>
-            <a:r>
-              <a:rPr lang="en-US" sz="1800" dirty="0" smtClean="0">
-                <a:effectLst/>
-                <a:latin typeface="Times New Roman" pitchFamily="18" charset="0"/>
-                <a:cs typeface="Times New Roman" pitchFamily="18" charset="0"/>
-              </a:rPr>
-              <a:t>Post</a:t>
-            </a:r>
-          </a:p>
-          <a:p>
-            <a:r>
-              <a:rPr lang="en-US" sz="1800" dirty="0">
-                <a:effectLst/>
-                <a:latin typeface="Times New Roman" pitchFamily="18" charset="0"/>
-                <a:cs typeface="Times New Roman" pitchFamily="18" charset="0"/>
-              </a:rPr>
-              <a:t>User Edits the Visibility of a </a:t>
-            </a:r>
-            <a:r>
-              <a:rPr lang="en-US" sz="1800" dirty="0" smtClean="0">
-                <a:effectLst/>
-                <a:latin typeface="Times New Roman" pitchFamily="18" charset="0"/>
-                <a:cs typeface="Times New Roman" pitchFamily="18" charset="0"/>
-              </a:rPr>
-              <a:t>Post</a:t>
-            </a:r>
-          </a:p>
-          <a:p>
-            <a:r>
-              <a:rPr lang="en-US" sz="1800" dirty="0">
-                <a:effectLst/>
-                <a:latin typeface="Times New Roman" pitchFamily="18" charset="0"/>
-                <a:cs typeface="Times New Roman" pitchFamily="18" charset="0"/>
-              </a:rPr>
-              <a:t>User Makes a Comment on a </a:t>
-            </a:r>
-            <a:r>
-              <a:rPr lang="en-US" sz="1800" dirty="0" smtClean="0">
-                <a:effectLst/>
-                <a:latin typeface="Times New Roman" pitchFamily="18" charset="0"/>
-                <a:cs typeface="Times New Roman" pitchFamily="18" charset="0"/>
-              </a:rPr>
-              <a:t>Post</a:t>
+              <a:rPr lang="en-US" b="1" dirty="0"/>
+              <a:t> Performance</a:t>
+            </a:r>
+            <a:r>
+              <a:rPr lang="en-CA" b="1" dirty="0"/>
+              <a:t> –</a:t>
+            </a:r>
+            <a:r>
+              <a:rPr lang="en-US" dirty="0"/>
+              <a:t> Loading all pages, updating database, completing requests within a few seconds.</a:t>
             </a:r>
             <a:endParaRPr lang="en-US" sz="1800" dirty="0">
-              <a:effectLst/>
               <a:latin typeface="Times New Roman" pitchFamily="18" charset="0"/>
               <a:cs typeface="Times New Roman" pitchFamily="18" charset="0"/>
             </a:endParaRPr>
           </a:p>
-        </p:txBody>
-      </p:sp>
-      <p:sp>
-        <p:nvSpPr>
-          <p:cNvPr id="4" name="Content Placeholder 3"/>
-          <p:cNvSpPr>
-            <a:spLocks noGrp="1"/>
-          </p:cNvSpPr>
-          <p:nvPr>
-            <p:ph sz="half" idx="2"/>
-          </p:nvPr>
-        </p:nvSpPr>
-        <p:spPr>
-          <a:xfrm>
-            <a:off x="5029200" y="1752600"/>
-            <a:ext cx="3505200" cy="3733800"/>
-          </a:xfrm>
-        </p:spPr>
-        <p:txBody>
-          <a:bodyPr>
-            <a:normAutofit/>
-          </a:bodyPr>
-          <a:lstStyle/>
-          <a:p>
-            <a:r>
-              <a:rPr lang="en-US" sz="1800" dirty="0">
-                <a:effectLst/>
-                <a:latin typeface="Times New Roman" pitchFamily="18" charset="0"/>
-                <a:cs typeface="Times New Roman" pitchFamily="18" charset="0"/>
-              </a:rPr>
-              <a:t>User Creates a Group</a:t>
-            </a:r>
-          </a:p>
-          <a:p>
-            <a:r>
-              <a:rPr lang="en-US" sz="1800" dirty="0">
-                <a:effectLst/>
-                <a:latin typeface="Times New Roman" pitchFamily="18" charset="0"/>
-                <a:cs typeface="Times New Roman" pitchFamily="18" charset="0"/>
-              </a:rPr>
-              <a:t>User Edits a Group</a:t>
-            </a:r>
-          </a:p>
-          <a:p>
-            <a:r>
-              <a:rPr lang="en-US" sz="1800" dirty="0">
-                <a:effectLst/>
-                <a:latin typeface="Times New Roman" pitchFamily="18" charset="0"/>
-                <a:cs typeface="Times New Roman" pitchFamily="18" charset="0"/>
-              </a:rPr>
-              <a:t>User Creates a </a:t>
-            </a:r>
-            <a:r>
-              <a:rPr lang="en-US" sz="1800" dirty="0" smtClean="0">
-                <a:effectLst/>
-                <a:latin typeface="Times New Roman" pitchFamily="18" charset="0"/>
-                <a:cs typeface="Times New Roman" pitchFamily="18" charset="0"/>
-              </a:rPr>
-              <a:t>Schedule</a:t>
-            </a:r>
-          </a:p>
-          <a:p>
-            <a:r>
-              <a:rPr lang="en-US" sz="1800" dirty="0">
-                <a:effectLst/>
-                <a:latin typeface="Times New Roman" pitchFamily="18" charset="0"/>
-                <a:cs typeface="Times New Roman" pitchFamily="18" charset="0"/>
-              </a:rPr>
-              <a:t>User Uploads a </a:t>
-            </a:r>
-            <a:r>
-              <a:rPr lang="en-US" sz="1800" dirty="0" smtClean="0">
-                <a:effectLst/>
-                <a:latin typeface="Times New Roman" pitchFamily="18" charset="0"/>
-                <a:cs typeface="Times New Roman" pitchFamily="18" charset="0"/>
-              </a:rPr>
-              <a:t>Resume</a:t>
-            </a:r>
-            <a:endParaRPr lang="fr-FR" sz="1800" dirty="0" smtClean="0">
-              <a:effectLst/>
-              <a:latin typeface="Times New Roman" pitchFamily="18" charset="0"/>
-              <a:cs typeface="Times New Roman" pitchFamily="18" charset="0"/>
-            </a:endParaRPr>
-          </a:p>
-          <a:p>
-            <a:r>
-              <a:rPr lang="en-US" sz="1800" dirty="0">
-                <a:effectLst/>
-                <a:latin typeface="Times New Roman" pitchFamily="18" charset="0"/>
-                <a:cs typeface="Times New Roman" pitchFamily="18" charset="0"/>
-              </a:rPr>
-              <a:t>User Adds Item to Lost and </a:t>
-            </a:r>
-            <a:r>
-              <a:rPr lang="en-US" sz="1800" dirty="0" smtClean="0">
-                <a:effectLst/>
-                <a:latin typeface="Times New Roman" pitchFamily="18" charset="0"/>
-                <a:cs typeface="Times New Roman" pitchFamily="18" charset="0"/>
-              </a:rPr>
-              <a:t>Found</a:t>
-            </a:r>
-          </a:p>
-          <a:p>
-            <a:r>
-              <a:rPr lang="en-US" sz="1800" dirty="0">
-                <a:effectLst/>
-                <a:latin typeface="Times New Roman" pitchFamily="18" charset="0"/>
-                <a:cs typeface="Times New Roman" pitchFamily="18" charset="0"/>
-              </a:rPr>
-              <a:t>User Removes an I</a:t>
-            </a:r>
-            <a:r>
-              <a:rPr lang="pt-PT" sz="1800" dirty="0">
-                <a:effectLst/>
-                <a:latin typeface="Times New Roman" pitchFamily="18" charset="0"/>
-                <a:cs typeface="Times New Roman" pitchFamily="18" charset="0"/>
-              </a:rPr>
-              <a:t>tem </a:t>
-            </a:r>
-            <a:r>
-              <a:rPr lang="en-US" sz="1800" dirty="0">
-                <a:effectLst/>
-                <a:latin typeface="Times New Roman" pitchFamily="18" charset="0"/>
-                <a:cs typeface="Times New Roman" pitchFamily="18" charset="0"/>
-              </a:rPr>
-              <a:t>from Lost and Found</a:t>
-            </a:r>
-          </a:p>
-          <a:p>
-            <a:r>
-              <a:rPr lang="en-US" sz="1800" dirty="0">
-                <a:effectLst/>
-                <a:latin typeface="Times New Roman" pitchFamily="18" charset="0"/>
-                <a:cs typeface="Times New Roman" pitchFamily="18" charset="0"/>
-              </a:rPr>
-              <a:t>User Creates a </a:t>
-            </a:r>
-            <a:r>
-              <a:rPr lang="en-US" sz="1800" dirty="0" smtClean="0">
-                <a:effectLst/>
-                <a:latin typeface="Times New Roman" pitchFamily="18" charset="0"/>
-                <a:cs typeface="Times New Roman" pitchFamily="18" charset="0"/>
-              </a:rPr>
-              <a:t>Poll</a:t>
-            </a:r>
-          </a:p>
-          <a:p>
-            <a:r>
-              <a:rPr lang="en-US" sz="1800" dirty="0">
-                <a:effectLst/>
-                <a:latin typeface="Times New Roman" pitchFamily="18" charset="0"/>
-                <a:cs typeface="Times New Roman" pitchFamily="18" charset="0"/>
-              </a:rPr>
-              <a:t>User Votes on a Poll</a:t>
-            </a:r>
-            <a:endParaRPr lang="en-US" sz="1800" dirty="0">
-              <a:latin typeface="Times New Roman" pitchFamily="18" charset="0"/>
-              <a:cs typeface="Times New Roman" pitchFamily="18" charset="0"/>
+          <a:p>
+            <a:r>
+              <a:rPr lang="en-US" b="1" dirty="0"/>
+              <a:t> Scalability</a:t>
+            </a:r>
+            <a:r>
+              <a:rPr lang="en-US" dirty="0"/>
+              <a:t> </a:t>
+            </a:r>
+            <a:r>
+              <a:rPr lang="en-CA" dirty="0"/>
+              <a:t>-</a:t>
+            </a:r>
+            <a:r>
+              <a:rPr lang="en-US" dirty="0"/>
+              <a:t>Maintain database of changing size as users add and remove content</a:t>
+            </a:r>
+          </a:p>
+          <a:p>
+            <a:r>
+              <a:rPr lang="it-IT" b="1" dirty="0"/>
+              <a:t>Capacity</a:t>
+            </a:r>
+            <a:r>
+              <a:rPr lang="en-CA" dirty="0"/>
+              <a:t>- Maintain multiple sessions and keep them separate based on user.</a:t>
+            </a:r>
+          </a:p>
+          <a:p>
+            <a:r>
+              <a:rPr lang="it-IT" b="1" dirty="0"/>
+              <a:t>Availabilty</a:t>
+            </a:r>
+            <a:r>
+              <a:rPr lang="en-CA" dirty="0"/>
+              <a:t>- Should be available to any user with a valid </a:t>
+            </a:r>
+            <a:r>
+              <a:rPr lang="en-CA" dirty="0" err="1"/>
+              <a:t>mun</a:t>
+            </a:r>
+            <a:r>
+              <a:rPr lang="en-CA" dirty="0"/>
+              <a:t> email address at any time</a:t>
+            </a:r>
+          </a:p>
+          <a:p>
+            <a:r>
+              <a:rPr lang="it-IT" b="1" dirty="0"/>
+              <a:t>Reliability</a:t>
+            </a:r>
+            <a:r>
+              <a:rPr lang="en-CA" dirty="0"/>
+              <a:t>- The system should have no critical errors to compromise user data/activity.  </a:t>
+            </a:r>
+            <a:endParaRPr lang="en-CA" dirty="0">
+              <a:latin typeface="+mj-lt"/>
             </a:endParaRPr>
           </a:p>
         </p:txBody>
@@ -11554,13 +11071,6 @@
   <p:clrMapOvr>
     <a:masterClrMapping/>
   </p:clrMapOvr>
-  <p:timing>
-    <p:tnLst>
-      <p:par>
-        <p:cTn id="1" dur="indefinite" restart="never" nodeType="tmRoot"/>
-      </p:par>
-    </p:tnLst>
-  </p:timing>
 </p:sld>
 </file>
 

</xml_diff>